<commit_message>
add all ordinary files
</commit_message>
<xml_diff>
--- a/[287期] PHP MySQL Final Project - 吳志豪_蘇冠羽.pptx
+++ b/[287期] PHP MySQL Final Project - 吳志豪_蘇冠羽.pptx
@@ -258,7 +258,7 @@
         <p:nvSpPr>
           <p:cNvPr id="4100" name="Rectangle 4"/>
           <p:cNvSpPr>
-            <a:spLocks noRot="1" noChangeArrowheads="1" noTextEdit="1"/>
+            <a:spLocks noGrp="1" noRot="1" noChangeAspect="1" noChangeArrowheads="1" noTextEdit="1"/>
           </p:cNvSpPr>
           <p:nvPr>
             <p:ph type="sldImg" idx="2"/>
@@ -756,7 +756,7 @@
             <a:fld id="{538473F1-7622-4AD2-B0D8-A7C2527EDFE2}" type="datetime1">
               <a:rPr lang="zh-TW" altLang="en-US" smtClean="0"/>
               <a:pPr/>
-              <a:t>2017/8/17</a:t>
+              <a:t>2017/8/19</a:t>
             </a:fld>
             <a:endParaRPr lang="en-US" altLang="zh-TW"/>
           </a:p>
@@ -3812,7 +3812,7 @@
             <a:fld id="{5DD117B5-00C8-4587-B499-5446781E789B}" type="datetime1">
               <a:rPr lang="zh-TW" altLang="en-US" smtClean="0"/>
               <a:pPr/>
-              <a:t>2017/8/17</a:t>
+              <a:t>2017/8/19</a:t>
             </a:fld>
             <a:endParaRPr lang="en-US" altLang="zh-TW"/>
           </a:p>
@@ -3989,7 +3989,7 @@
             <a:fld id="{F50D2DF6-C4A7-41AE-ABAB-49219021D6E5}" type="datetime1">
               <a:rPr lang="zh-TW" altLang="en-US" smtClean="0"/>
               <a:pPr/>
-              <a:t>2017/8/17</a:t>
+              <a:t>2017/8/19</a:t>
             </a:fld>
             <a:endParaRPr lang="en-US" altLang="zh-TW"/>
           </a:p>
@@ -4156,7 +4156,7 @@
             <a:fld id="{783D51FF-348A-4F85-9A37-9CF4D63C2B30}" type="datetime1">
               <a:rPr lang="zh-TW" altLang="en-US" smtClean="0"/>
               <a:pPr/>
-              <a:t>2017/8/17</a:t>
+              <a:t>2017/8/19</a:t>
             </a:fld>
             <a:endParaRPr lang="en-US" altLang="zh-TW"/>
           </a:p>
@@ -4399,7 +4399,7 @@
             <a:fld id="{D3CE766A-B47A-42DC-9B3C-1C8F47B72036}" type="datetime1">
               <a:rPr lang="zh-TW" altLang="en-US" smtClean="0"/>
               <a:pPr/>
-              <a:t>2017/8/17</a:t>
+              <a:t>2017/8/19</a:t>
             </a:fld>
             <a:endParaRPr lang="en-US" altLang="zh-TW"/>
           </a:p>
@@ -4684,7 +4684,7 @@
             <a:fld id="{5AB25D64-6BA6-4D7C-9E1D-8B51CE0E0CED}" type="datetime1">
               <a:rPr lang="zh-TW" altLang="en-US" smtClean="0"/>
               <a:pPr/>
-              <a:t>2017/8/17</a:t>
+              <a:t>2017/8/19</a:t>
             </a:fld>
             <a:endParaRPr lang="en-US" altLang="zh-TW"/>
           </a:p>
@@ -5103,7 +5103,7 @@
             <a:fld id="{761DD325-6803-4814-BDC1-3B4897429E3C}" type="datetime1">
               <a:rPr lang="zh-TW" altLang="en-US" smtClean="0"/>
               <a:pPr/>
-              <a:t>2017/8/17</a:t>
+              <a:t>2017/8/19</a:t>
             </a:fld>
             <a:endParaRPr lang="en-US" altLang="zh-TW"/>
           </a:p>
@@ -5218,7 +5218,7 @@
             <a:fld id="{D7F22072-0931-461D-A68C-2EC00D5D3949}" type="datetime1">
               <a:rPr lang="zh-TW" altLang="en-US" smtClean="0"/>
               <a:pPr/>
-              <a:t>2017/8/17</a:t>
+              <a:t>2017/8/19</a:t>
             </a:fld>
             <a:endParaRPr lang="en-US" altLang="zh-TW"/>
           </a:p>
@@ -5310,7 +5310,7 @@
             <a:fld id="{AE60F580-3963-4466-A2CB-E922CD6E4E35}" type="datetime1">
               <a:rPr lang="zh-TW" altLang="en-US" smtClean="0"/>
               <a:pPr/>
-              <a:t>2017/8/17</a:t>
+              <a:t>2017/8/19</a:t>
             </a:fld>
             <a:endParaRPr lang="en-US" altLang="zh-TW"/>
           </a:p>
@@ -5584,7 +5584,7 @@
             <a:fld id="{ED9147B6-3A65-408B-A73B-FD71373C241A}" type="datetime1">
               <a:rPr lang="zh-TW" altLang="en-US" smtClean="0"/>
               <a:pPr/>
-              <a:t>2017/8/17</a:t>
+              <a:t>2017/8/19</a:t>
             </a:fld>
             <a:endParaRPr lang="en-US" altLang="zh-TW"/>
           </a:p>
@@ -5834,7 +5834,7 @@
             <a:fld id="{E215B87E-1CC8-4FA9-B7DF-85E6D39A0BCE}" type="datetime1">
               <a:rPr lang="zh-TW" altLang="en-US" smtClean="0"/>
               <a:pPr/>
-              <a:t>2017/8/17</a:t>
+              <a:t>2017/8/19</a:t>
             </a:fld>
             <a:endParaRPr lang="en-US" altLang="zh-TW"/>
           </a:p>
@@ -6044,7 +6044,7 @@
             <a:fld id="{A5A0CF12-DE80-4EA9-9884-793F2AF956C5}" type="datetime1">
               <a:rPr lang="zh-TW" altLang="en-US" smtClean="0"/>
               <a:pPr/>
-              <a:t>2017/8/17</a:t>
+              <a:t>2017/8/19</a:t>
             </a:fld>
             <a:endParaRPr lang="en-US" altLang="zh-TW"/>
           </a:p>
@@ -6627,7 +6627,7 @@
             <a:fld id="{92A65EBB-2D7C-41AD-9831-2C87F5706D5E}" type="datetime1">
               <a:rPr lang="zh-TW" altLang="en-US"/>
               <a:pPr/>
-              <a:t>2017/8/17</a:t>
+              <a:t>2017/8/19</a:t>
             </a:fld>
             <a:endParaRPr lang="en-US" altLang="zh-TW"/>
           </a:p>
@@ -6977,7 +6977,7 @@
             <a:fld id="{783D51FF-348A-4F85-9A37-9CF4D63C2B30}" type="datetime1">
               <a:rPr lang="zh-TW" altLang="en-US" smtClean="0"/>
               <a:pPr/>
-              <a:t>2017/8/17</a:t>
+              <a:t>2017/8/19</a:t>
             </a:fld>
             <a:endParaRPr lang="en-US" altLang="zh-TW"/>
           </a:p>
@@ -7067,7 +7067,7 @@
             <a:fld id="{783D51FF-348A-4F85-9A37-9CF4D63C2B30}" type="datetime1">
               <a:rPr lang="zh-TW" altLang="en-US" smtClean="0"/>
               <a:pPr/>
-              <a:t>2017/8/17</a:t>
+              <a:t>2017/8/19</a:t>
             </a:fld>
             <a:endParaRPr lang="en-US" altLang="zh-TW"/>
           </a:p>
@@ -8325,7 +8325,7 @@
             <a:fld id="{AE60F580-3963-4466-A2CB-E922CD6E4E35}" type="datetime1">
               <a:rPr lang="zh-TW" altLang="en-US" smtClean="0"/>
               <a:pPr/>
-              <a:t>2017/8/17</a:t>
+              <a:t>2017/8/19</a:t>
             </a:fld>
             <a:endParaRPr lang="en-US" altLang="zh-TW"/>
           </a:p>
@@ -8515,8 +8515,8 @@
         </p:nvSpPr>
         <p:spPr>
           <a:xfrm>
-            <a:off x="683568" y="2204864"/>
-            <a:ext cx="1008112" cy="648072"/>
+            <a:off x="251520" y="2204864"/>
+            <a:ext cx="1440160" cy="648072"/>
           </a:xfrm>
           <a:prstGeom prst="ellipse">
             <a:avLst/>
@@ -8552,7 +8552,7 @@
                   <a:schemeClr val="tx1"/>
                 </a:solidFill>
               </a:rPr>
-              <a:t>name</a:t>
+              <a:t>nickname</a:t>
             </a:r>
             <a:endParaRPr lang="zh-TW" altLang="en-US" dirty="0">
               <a:solidFill>
@@ -8657,20 +8657,12 @@
           <a:p>
             <a:pPr algn="ctr"/>
             <a:r>
-              <a:rPr lang="en-US" altLang="zh-TW" dirty="0" err="1">
+              <a:rPr lang="en-US" altLang="zh-TW" dirty="0" smtClean="0">
                 <a:solidFill>
                   <a:schemeClr val="tx1"/>
                 </a:solidFill>
               </a:rPr>
-              <a:t>m</a:t>
-            </a:r>
-            <a:r>
-              <a:rPr lang="en-US" altLang="zh-TW" dirty="0" err="1" smtClean="0">
-                <a:solidFill>
-                  <a:schemeClr val="tx1"/>
-                </a:solidFill>
-              </a:rPr>
-              <a:t>ember_id</a:t>
+              <a:t>id</a:t>
             </a:r>
             <a:endParaRPr lang="zh-TW" altLang="en-US" dirty="0">
               <a:solidFill>
@@ -9316,6 +9308,93 @@
           <a:xfrm flipH="1" flipV="1">
             <a:off x="6681372" y="3025712"/>
             <a:ext cx="194884" cy="1663428"/>
+          </a:xfrm>
+          <a:prstGeom prst="line">
+            <a:avLst/>
+          </a:prstGeom>
+        </p:spPr>
+        <p:style>
+          <a:lnRef idx="1">
+            <a:schemeClr val="accent1"/>
+          </a:lnRef>
+          <a:fillRef idx="0">
+            <a:schemeClr val="accent1"/>
+          </a:fillRef>
+          <a:effectRef idx="0">
+            <a:schemeClr val="accent1"/>
+          </a:effectRef>
+          <a:fontRef idx="minor">
+            <a:schemeClr val="tx1"/>
+          </a:fontRef>
+        </p:style>
+      </p:cxnSp>
+      <p:sp>
+        <p:nvSpPr>
+          <p:cNvPr id="28" name="橢圓 27"/>
+          <p:cNvSpPr/>
+          <p:nvPr/>
+        </p:nvSpPr>
+        <p:spPr>
+          <a:xfrm>
+            <a:off x="6876256" y="620688"/>
+            <a:ext cx="1872208" cy="648072"/>
+          </a:xfrm>
+          <a:prstGeom prst="ellipse">
+            <a:avLst/>
+          </a:prstGeom>
+          <a:solidFill>
+            <a:schemeClr val="bg1"/>
+          </a:solidFill>
+        </p:spPr>
+        <p:style>
+          <a:lnRef idx="2">
+            <a:schemeClr val="accent1">
+              <a:shade val="50000"/>
+            </a:schemeClr>
+          </a:lnRef>
+          <a:fillRef idx="1">
+            <a:schemeClr val="accent1"/>
+          </a:fillRef>
+          <a:effectRef idx="0">
+            <a:schemeClr val="accent1"/>
+          </a:effectRef>
+          <a:fontRef idx="minor">
+            <a:schemeClr val="lt1"/>
+          </a:fontRef>
+        </p:style>
+        <p:txBody>
+          <a:bodyPr rtlCol="0" anchor="ctr"/>
+          <a:lstStyle/>
+          <a:p>
+            <a:pPr algn="ctr"/>
+            <a:r>
+              <a:rPr lang="en-US" altLang="zh-TW" dirty="0" smtClean="0">
+                <a:solidFill>
+                  <a:schemeClr val="tx1"/>
+                </a:solidFill>
+              </a:rPr>
+              <a:t>nickname</a:t>
+            </a:r>
+            <a:endParaRPr lang="zh-TW" altLang="en-US" dirty="0">
+              <a:solidFill>
+                <a:schemeClr val="tx1"/>
+              </a:solidFill>
+            </a:endParaRPr>
+          </a:p>
+        </p:txBody>
+      </p:sp>
+      <p:cxnSp>
+        <p:nvCxnSpPr>
+          <p:cNvPr id="32" name="直線接點 31"/>
+          <p:cNvCxnSpPr>
+            <a:stCxn id="28" idx="2"/>
+          </p:cNvCxnSpPr>
+          <p:nvPr/>
+        </p:nvCxnSpPr>
+        <p:spPr>
+          <a:xfrm flipH="1">
+            <a:off x="6660232" y="944724"/>
+            <a:ext cx="216024" cy="1980220"/>
           </a:xfrm>
           <a:prstGeom prst="line">
             <a:avLst/>

</xml_diff>